<commit_message>
Update user guide images
</commit_message>
<xml_diff>
--- a/assets/img/Images.pptx
+++ b/assets/img/Images.pptx
@@ -219,7 +219,7 @@
           <a:p>
             <a:fld id="{0CC1478D-87B6-451A-8696-61271112EFBC}" type="datetimeFigureOut">
               <a:rPr lang="en-US" smtClean="0"/>
-              <a:t>6/15/2018</a:t>
+              <a:t>6/16/2018</a:t>
             </a:fld>
             <a:endParaRPr lang="en-US"/>
           </a:p>
@@ -377,7 +377,7 @@
           <a:p>
             <a:fld id="{7E2FC2BD-A5B6-4DBB-BAF8-AB16095C304E}" type="slidenum">
               <a:rPr lang="en-US" smtClean="0"/>
-              <a:t>‹nr.›</a:t>
+              <a:t>‹#›</a:t>
             </a:fld>
             <a:endParaRPr lang="en-US"/>
           </a:p>
@@ -714,7 +714,7 @@
           <a:p>
             <a:fld id="{788667A8-8BE1-4384-8E52-CA6CA56C077B}" type="datetimeFigureOut">
               <a:rPr lang="en-US" smtClean="0"/>
-              <a:t>6/15/2018</a:t>
+              <a:t>6/16/2018</a:t>
             </a:fld>
             <a:endParaRPr lang="en-US"/>
           </a:p>
@@ -756,7 +756,7 @@
           <a:p>
             <a:fld id="{A50B7793-5ADB-4896-83B0-DF67F8F54EE6}" type="slidenum">
               <a:rPr lang="en-US" smtClean="0"/>
-              <a:t>‹nr.›</a:t>
+              <a:t>‹#›</a:t>
             </a:fld>
             <a:endParaRPr lang="en-US"/>
           </a:p>
@@ -884,7 +884,7 @@
           <a:p>
             <a:fld id="{788667A8-8BE1-4384-8E52-CA6CA56C077B}" type="datetimeFigureOut">
               <a:rPr lang="en-US" smtClean="0"/>
-              <a:t>6/15/2018</a:t>
+              <a:t>6/16/2018</a:t>
             </a:fld>
             <a:endParaRPr lang="en-US"/>
           </a:p>
@@ -926,7 +926,7 @@
           <a:p>
             <a:fld id="{A50B7793-5ADB-4896-83B0-DF67F8F54EE6}" type="slidenum">
               <a:rPr lang="en-US" smtClean="0"/>
-              <a:t>‹nr.›</a:t>
+              <a:t>‹#›</a:t>
             </a:fld>
             <a:endParaRPr lang="en-US"/>
           </a:p>
@@ -1064,7 +1064,7 @@
           <a:p>
             <a:fld id="{788667A8-8BE1-4384-8E52-CA6CA56C077B}" type="datetimeFigureOut">
               <a:rPr lang="en-US" smtClean="0"/>
-              <a:t>6/15/2018</a:t>
+              <a:t>6/16/2018</a:t>
             </a:fld>
             <a:endParaRPr lang="en-US"/>
           </a:p>
@@ -1106,7 +1106,7 @@
           <a:p>
             <a:fld id="{A50B7793-5ADB-4896-83B0-DF67F8F54EE6}" type="slidenum">
               <a:rPr lang="en-US" smtClean="0"/>
-              <a:t>‹nr.›</a:t>
+              <a:t>‹#›</a:t>
             </a:fld>
             <a:endParaRPr lang="en-US"/>
           </a:p>
@@ -1294,7 +1294,7 @@
           <a:p>
             <a:fld id="{788667A8-8BE1-4384-8E52-CA6CA56C077B}" type="datetimeFigureOut">
               <a:rPr lang="en-US" smtClean="0"/>
-              <a:t>6/15/2018</a:t>
+              <a:t>6/16/2018</a:t>
             </a:fld>
             <a:endParaRPr lang="en-US"/>
           </a:p>
@@ -1336,7 +1336,7 @@
           <a:p>
             <a:fld id="{A50B7793-5ADB-4896-83B0-DF67F8F54EE6}" type="slidenum">
               <a:rPr lang="en-US" smtClean="0"/>
-              <a:t>‹nr.›</a:t>
+              <a:t>‹#›</a:t>
             </a:fld>
             <a:endParaRPr lang="en-US"/>
           </a:p>
@@ -1538,7 +1538,7 @@
           <a:p>
             <a:fld id="{788667A8-8BE1-4384-8E52-CA6CA56C077B}" type="datetimeFigureOut">
               <a:rPr lang="en-US" smtClean="0"/>
-              <a:t>6/15/2018</a:t>
+              <a:t>6/16/2018</a:t>
             </a:fld>
             <a:endParaRPr lang="en-US"/>
           </a:p>
@@ -1580,7 +1580,7 @@
           <a:p>
             <a:fld id="{A50B7793-5ADB-4896-83B0-DF67F8F54EE6}" type="slidenum">
               <a:rPr lang="en-US" smtClean="0"/>
-              <a:t>‹nr.›</a:t>
+              <a:t>‹#›</a:t>
             </a:fld>
             <a:endParaRPr lang="en-US"/>
           </a:p>
@@ -1770,7 +1770,7 @@
           <a:p>
             <a:fld id="{788667A8-8BE1-4384-8E52-CA6CA56C077B}" type="datetimeFigureOut">
               <a:rPr lang="en-US" smtClean="0"/>
-              <a:t>6/15/2018</a:t>
+              <a:t>6/16/2018</a:t>
             </a:fld>
             <a:endParaRPr lang="en-US"/>
           </a:p>
@@ -1812,7 +1812,7 @@
           <a:p>
             <a:fld id="{A50B7793-5ADB-4896-83B0-DF67F8F54EE6}" type="slidenum">
               <a:rPr lang="en-US" smtClean="0"/>
-              <a:t>‹nr.›</a:t>
+              <a:t>‹#›</a:t>
             </a:fld>
             <a:endParaRPr lang="en-US"/>
           </a:p>
@@ -2137,7 +2137,7 @@
           <a:p>
             <a:fld id="{788667A8-8BE1-4384-8E52-CA6CA56C077B}" type="datetimeFigureOut">
               <a:rPr lang="en-US" smtClean="0"/>
-              <a:t>6/15/2018</a:t>
+              <a:t>6/16/2018</a:t>
             </a:fld>
             <a:endParaRPr lang="en-US"/>
           </a:p>
@@ -2179,7 +2179,7 @@
           <a:p>
             <a:fld id="{A50B7793-5ADB-4896-83B0-DF67F8F54EE6}" type="slidenum">
               <a:rPr lang="en-US" smtClean="0"/>
-              <a:t>‹nr.›</a:t>
+              <a:t>‹#›</a:t>
             </a:fld>
             <a:endParaRPr lang="en-US"/>
           </a:p>
@@ -2255,7 +2255,7 @@
           <a:p>
             <a:fld id="{788667A8-8BE1-4384-8E52-CA6CA56C077B}" type="datetimeFigureOut">
               <a:rPr lang="en-US" smtClean="0"/>
-              <a:t>6/15/2018</a:t>
+              <a:t>6/16/2018</a:t>
             </a:fld>
             <a:endParaRPr lang="en-US"/>
           </a:p>
@@ -2297,7 +2297,7 @@
           <a:p>
             <a:fld id="{A50B7793-5ADB-4896-83B0-DF67F8F54EE6}" type="slidenum">
               <a:rPr lang="en-US" smtClean="0"/>
-              <a:t>‹nr.›</a:t>
+              <a:t>‹#›</a:t>
             </a:fld>
             <a:endParaRPr lang="en-US"/>
           </a:p>
@@ -2350,7 +2350,7 @@
           <a:p>
             <a:fld id="{788667A8-8BE1-4384-8E52-CA6CA56C077B}" type="datetimeFigureOut">
               <a:rPr lang="en-US" smtClean="0"/>
-              <a:t>6/15/2018</a:t>
+              <a:t>6/16/2018</a:t>
             </a:fld>
             <a:endParaRPr lang="en-US"/>
           </a:p>
@@ -2392,7 +2392,7 @@
           <a:p>
             <a:fld id="{A50B7793-5ADB-4896-83B0-DF67F8F54EE6}" type="slidenum">
               <a:rPr lang="en-US" smtClean="0"/>
-              <a:t>‹nr.›</a:t>
+              <a:t>‹#›</a:t>
             </a:fld>
             <a:endParaRPr lang="en-US"/>
           </a:p>
@@ -2627,7 +2627,7 @@
           <a:p>
             <a:fld id="{788667A8-8BE1-4384-8E52-CA6CA56C077B}" type="datetimeFigureOut">
               <a:rPr lang="en-US" smtClean="0"/>
-              <a:t>6/15/2018</a:t>
+              <a:t>6/16/2018</a:t>
             </a:fld>
             <a:endParaRPr lang="en-US"/>
           </a:p>
@@ -2669,7 +2669,7 @@
           <a:p>
             <a:fld id="{A50B7793-5ADB-4896-83B0-DF67F8F54EE6}" type="slidenum">
               <a:rPr lang="en-US" smtClean="0"/>
-              <a:t>‹nr.›</a:t>
+              <a:t>‹#›</a:t>
             </a:fld>
             <a:endParaRPr lang="en-US"/>
           </a:p>
@@ -2884,7 +2884,7 @@
           <a:p>
             <a:fld id="{788667A8-8BE1-4384-8E52-CA6CA56C077B}" type="datetimeFigureOut">
               <a:rPr lang="en-US" smtClean="0"/>
-              <a:t>6/15/2018</a:t>
+              <a:t>6/16/2018</a:t>
             </a:fld>
             <a:endParaRPr lang="en-US"/>
           </a:p>
@@ -2926,7 +2926,7 @@
           <a:p>
             <a:fld id="{A50B7793-5ADB-4896-83B0-DF67F8F54EE6}" type="slidenum">
               <a:rPr lang="en-US" smtClean="0"/>
-              <a:t>‹nr.›</a:t>
+              <a:t>‹#›</a:t>
             </a:fld>
             <a:endParaRPr lang="en-US"/>
           </a:p>
@@ -3097,7 +3097,7 @@
           <a:p>
             <a:fld id="{788667A8-8BE1-4384-8E52-CA6CA56C077B}" type="datetimeFigureOut">
               <a:rPr lang="en-US" smtClean="0"/>
-              <a:t>6/15/2018</a:t>
+              <a:t>6/16/2018</a:t>
             </a:fld>
             <a:endParaRPr lang="en-US"/>
           </a:p>
@@ -3175,7 +3175,7 @@
           <a:p>
             <a:fld id="{A50B7793-5ADB-4896-83B0-DF67F8F54EE6}" type="slidenum">
               <a:rPr lang="en-US" smtClean="0"/>
-              <a:t>‹nr.›</a:t>
+              <a:t>‹#›</a:t>
             </a:fld>
             <a:endParaRPr lang="en-US"/>
           </a:p>
@@ -3540,16 +3540,10 @@
           <a:p>
             <a:pPr algn="ctr"/>
             <a:r>
-              <a:rPr lang="en-US" sz="1350" dirty="0"/>
-              <a:t>DSM</a:t>
-            </a:r>
-          </a:p>
-          <a:p>
-            <a:pPr algn="ctr"/>
-            <a:r>
-              <a:rPr lang="en-US" sz="1350" dirty="0"/>
+              <a:rPr lang="en-US" sz="1350" dirty="0" smtClean="0"/>
               <a:t>Viewer</a:t>
             </a:r>
+            <a:endParaRPr lang="en-US" sz="1350" dirty="0"/>
           </a:p>
         </p:txBody>
       </p:sp>
@@ -3597,9 +3591,10 @@
           <a:p>
             <a:pPr algn="ctr"/>
             <a:r>
-              <a:rPr lang="en-US" sz="1350" dirty="0"/>
-              <a:t>DSM Builder</a:t>
-            </a:r>
+              <a:rPr lang="en-US" sz="1350" dirty="0" smtClean="0"/>
+              <a:t>Builder</a:t>
+            </a:r>
+            <a:endParaRPr lang="en-US" sz="1350" dirty="0"/>
           </a:p>
         </p:txBody>
       </p:sp>
@@ -3647,8 +3642,13 @@
             <a:pPr algn="ctr"/>
             <a:r>
               <a:rPr lang="en-US" sz="1350" dirty="0"/>
-              <a:t>DSI Schema</a:t>
-            </a:r>
+              <a:t>d</a:t>
+            </a:r>
+            <a:r>
+              <a:rPr lang="en-US" sz="1350" dirty="0" smtClean="0"/>
+              <a:t>si.xsd</a:t>
+            </a:r>
+            <a:endParaRPr lang="en-US" sz="1350" dirty="0"/>
           </a:p>
         </p:txBody>
       </p:sp>
@@ -3759,8 +3759,13 @@
             <a:pPr algn="ctr"/>
             <a:r>
               <a:rPr lang="en-US" sz="1350" dirty="0"/>
-              <a:t>File</a:t>
-            </a:r>
+              <a:t>f</a:t>
+            </a:r>
+            <a:r>
+              <a:rPr lang="en-US" sz="1350" dirty="0" smtClean="0"/>
+              <a:t>ile</a:t>
+            </a:r>
+            <a:endParaRPr lang="en-US" sz="1350" dirty="0"/>
           </a:p>
         </p:txBody>
       </p:sp>
@@ -3816,7 +3821,7 @@
         <p:spPr>
           <a:xfrm>
             <a:off x="665806" y="2808496"/>
-            <a:ext cx="1865594" cy="715581"/>
+            <a:ext cx="1865594" cy="507831"/>
           </a:xfrm>
           <a:prstGeom prst="rect">
             <a:avLst/>
@@ -3835,15 +3840,15 @@
             </a:r>
             <a:r>
               <a:rPr lang="en-US" sz="1350" dirty="0"/>
-              <a:t>, Java, C++, Visual Studio, </a:t>
-            </a:r>
-            <a:r>
-              <a:rPr lang="en-US" sz="1350" dirty="0" err="1"/>
-              <a:t>GrapML</a:t>
+              <a:t>, Java, C++, Visual </a:t>
+            </a:r>
+            <a:r>
+              <a:rPr lang="en-US" sz="1350" dirty="0" smtClean="0"/>
+              <a:t>Studio and </a:t>
             </a:r>
             <a:r>
               <a:rPr lang="en-US" sz="1350" dirty="0"/>
-              <a:t> and UML</a:t>
+              <a:t>UML</a:t>
             </a:r>
           </a:p>
         </p:txBody>

</xml_diff>

<commit_message>
Update about.md, Images.pptx, and 4 more files...
</commit_message>
<xml_diff>
--- a/assets/img/Images.pptx
+++ b/assets/img/Images.pptx
@@ -212,7 +212,7 @@
           <a:p>
             <a:fld id="{0CC1478D-87B6-451A-8696-61271112EFBC}" type="datetimeFigureOut">
               <a:rPr lang="en-US" smtClean="0"/>
-              <a:t>1/3/2021</a:t>
+              <a:t>1/12/2021</a:t>
             </a:fld>
             <a:endParaRPr lang="en-US"/>
           </a:p>
@@ -610,7 +610,7 @@
           <a:p>
             <a:fld id="{788667A8-8BE1-4384-8E52-CA6CA56C077B}" type="datetimeFigureOut">
               <a:rPr lang="en-US" smtClean="0"/>
-              <a:t>1/3/2021</a:t>
+              <a:t>1/12/2021</a:t>
             </a:fld>
             <a:endParaRPr lang="en-US"/>
           </a:p>
@@ -780,7 +780,7 @@
           <a:p>
             <a:fld id="{788667A8-8BE1-4384-8E52-CA6CA56C077B}" type="datetimeFigureOut">
               <a:rPr lang="en-US" smtClean="0"/>
-              <a:t>1/3/2021</a:t>
+              <a:t>1/12/2021</a:t>
             </a:fld>
             <a:endParaRPr lang="en-US"/>
           </a:p>
@@ -960,7 +960,7 @@
           <a:p>
             <a:fld id="{788667A8-8BE1-4384-8E52-CA6CA56C077B}" type="datetimeFigureOut">
               <a:rPr lang="en-US" smtClean="0"/>
-              <a:t>1/3/2021</a:t>
+              <a:t>1/12/2021</a:t>
             </a:fld>
             <a:endParaRPr lang="en-US"/>
           </a:p>
@@ -1190,7 +1190,7 @@
           <a:p>
             <a:fld id="{788667A8-8BE1-4384-8E52-CA6CA56C077B}" type="datetimeFigureOut">
               <a:rPr lang="en-US" smtClean="0"/>
-              <a:t>1/3/2021</a:t>
+              <a:t>1/12/2021</a:t>
             </a:fld>
             <a:endParaRPr lang="en-US"/>
           </a:p>
@@ -1434,7 +1434,7 @@
           <a:p>
             <a:fld id="{788667A8-8BE1-4384-8E52-CA6CA56C077B}" type="datetimeFigureOut">
               <a:rPr lang="en-US" smtClean="0"/>
-              <a:t>1/3/2021</a:t>
+              <a:t>1/12/2021</a:t>
             </a:fld>
             <a:endParaRPr lang="en-US"/>
           </a:p>
@@ -1666,7 +1666,7 @@
           <a:p>
             <a:fld id="{788667A8-8BE1-4384-8E52-CA6CA56C077B}" type="datetimeFigureOut">
               <a:rPr lang="en-US" smtClean="0"/>
-              <a:t>1/3/2021</a:t>
+              <a:t>1/12/2021</a:t>
             </a:fld>
             <a:endParaRPr lang="en-US"/>
           </a:p>
@@ -2033,7 +2033,7 @@
           <a:p>
             <a:fld id="{788667A8-8BE1-4384-8E52-CA6CA56C077B}" type="datetimeFigureOut">
               <a:rPr lang="en-US" smtClean="0"/>
-              <a:t>1/3/2021</a:t>
+              <a:t>1/12/2021</a:t>
             </a:fld>
             <a:endParaRPr lang="en-US"/>
           </a:p>
@@ -2151,7 +2151,7 @@
           <a:p>
             <a:fld id="{788667A8-8BE1-4384-8E52-CA6CA56C077B}" type="datetimeFigureOut">
               <a:rPr lang="en-US" smtClean="0"/>
-              <a:t>1/3/2021</a:t>
+              <a:t>1/12/2021</a:t>
             </a:fld>
             <a:endParaRPr lang="en-US"/>
           </a:p>
@@ -2246,7 +2246,7 @@
           <a:p>
             <a:fld id="{788667A8-8BE1-4384-8E52-CA6CA56C077B}" type="datetimeFigureOut">
               <a:rPr lang="en-US" smtClean="0"/>
-              <a:t>1/3/2021</a:t>
+              <a:t>1/12/2021</a:t>
             </a:fld>
             <a:endParaRPr lang="en-US"/>
           </a:p>
@@ -2523,7 +2523,7 @@
           <a:p>
             <a:fld id="{788667A8-8BE1-4384-8E52-CA6CA56C077B}" type="datetimeFigureOut">
               <a:rPr lang="en-US" smtClean="0"/>
-              <a:t>1/3/2021</a:t>
+              <a:t>1/12/2021</a:t>
             </a:fld>
             <a:endParaRPr lang="en-US"/>
           </a:p>
@@ -2780,7 +2780,7 @@
           <a:p>
             <a:fld id="{788667A8-8BE1-4384-8E52-CA6CA56C077B}" type="datetimeFigureOut">
               <a:rPr lang="en-US" smtClean="0"/>
-              <a:t>1/3/2021</a:t>
+              <a:t>1/12/2021</a:t>
             </a:fld>
             <a:endParaRPr lang="en-US"/>
           </a:p>
@@ -2993,7 +2993,7 @@
           <a:p>
             <a:fld id="{788667A8-8BE1-4384-8E52-CA6CA56C077B}" type="datetimeFigureOut">
               <a:rPr lang="en-US" smtClean="0"/>
-              <a:t>1/3/2021</a:t>
+              <a:t>1/12/2021</a:t>
             </a:fld>
             <a:endParaRPr lang="en-US"/>
           </a:p>
@@ -7595,7 +7595,7 @@
         <p:spPr>
           <a:xfrm>
             <a:off x="4491037" y="1310094"/>
-            <a:ext cx="2135982" cy="1502162"/>
+            <a:ext cx="1833563" cy="1502162"/>
           </a:xfrm>
           <a:prstGeom prst="rect">
             <a:avLst/>

</xml_diff>

<commit_message>
Update Images.pptx and model_navigation.png
</commit_message>
<xml_diff>
--- a/assets/img/Images.pptx
+++ b/assets/img/Images.pptx
@@ -223,7 +223,7 @@
           <a:p>
             <a:fld id="{0CC1478D-87B6-451A-8696-61271112EFBC}" type="datetimeFigureOut">
               <a:rPr lang="en-US" smtClean="0"/>
-              <a:t>1/17/2021</a:t>
+              <a:t>1/18/2021</a:t>
             </a:fld>
             <a:endParaRPr lang="en-US"/>
           </a:p>
@@ -621,7 +621,7 @@
           <a:p>
             <a:fld id="{788667A8-8BE1-4384-8E52-CA6CA56C077B}" type="datetimeFigureOut">
               <a:rPr lang="en-US" smtClean="0"/>
-              <a:t>1/17/2021</a:t>
+              <a:t>1/18/2021</a:t>
             </a:fld>
             <a:endParaRPr lang="en-US"/>
           </a:p>
@@ -791,7 +791,7 @@
           <a:p>
             <a:fld id="{788667A8-8BE1-4384-8E52-CA6CA56C077B}" type="datetimeFigureOut">
               <a:rPr lang="en-US" smtClean="0"/>
-              <a:t>1/17/2021</a:t>
+              <a:t>1/18/2021</a:t>
             </a:fld>
             <a:endParaRPr lang="en-US"/>
           </a:p>
@@ -971,7 +971,7 @@
           <a:p>
             <a:fld id="{788667A8-8BE1-4384-8E52-CA6CA56C077B}" type="datetimeFigureOut">
               <a:rPr lang="en-US" smtClean="0"/>
-              <a:t>1/17/2021</a:t>
+              <a:t>1/18/2021</a:t>
             </a:fld>
             <a:endParaRPr lang="en-US"/>
           </a:p>
@@ -1201,7 +1201,7 @@
           <a:p>
             <a:fld id="{788667A8-8BE1-4384-8E52-CA6CA56C077B}" type="datetimeFigureOut">
               <a:rPr lang="en-US" smtClean="0"/>
-              <a:t>1/17/2021</a:t>
+              <a:t>1/18/2021</a:t>
             </a:fld>
             <a:endParaRPr lang="en-US"/>
           </a:p>
@@ -1445,7 +1445,7 @@
           <a:p>
             <a:fld id="{788667A8-8BE1-4384-8E52-CA6CA56C077B}" type="datetimeFigureOut">
               <a:rPr lang="en-US" smtClean="0"/>
-              <a:t>1/17/2021</a:t>
+              <a:t>1/18/2021</a:t>
             </a:fld>
             <a:endParaRPr lang="en-US"/>
           </a:p>
@@ -1677,7 +1677,7 @@
           <a:p>
             <a:fld id="{788667A8-8BE1-4384-8E52-CA6CA56C077B}" type="datetimeFigureOut">
               <a:rPr lang="en-US" smtClean="0"/>
-              <a:t>1/17/2021</a:t>
+              <a:t>1/18/2021</a:t>
             </a:fld>
             <a:endParaRPr lang="en-US"/>
           </a:p>
@@ -2044,7 +2044,7 @@
           <a:p>
             <a:fld id="{788667A8-8BE1-4384-8E52-CA6CA56C077B}" type="datetimeFigureOut">
               <a:rPr lang="en-US" smtClean="0"/>
-              <a:t>1/17/2021</a:t>
+              <a:t>1/18/2021</a:t>
             </a:fld>
             <a:endParaRPr lang="en-US"/>
           </a:p>
@@ -2162,7 +2162,7 @@
           <a:p>
             <a:fld id="{788667A8-8BE1-4384-8E52-CA6CA56C077B}" type="datetimeFigureOut">
               <a:rPr lang="en-US" smtClean="0"/>
-              <a:t>1/17/2021</a:t>
+              <a:t>1/18/2021</a:t>
             </a:fld>
             <a:endParaRPr lang="en-US"/>
           </a:p>
@@ -2257,7 +2257,7 @@
           <a:p>
             <a:fld id="{788667A8-8BE1-4384-8E52-CA6CA56C077B}" type="datetimeFigureOut">
               <a:rPr lang="en-US" smtClean="0"/>
-              <a:t>1/17/2021</a:t>
+              <a:t>1/18/2021</a:t>
             </a:fld>
             <a:endParaRPr lang="en-US"/>
           </a:p>
@@ -2534,7 +2534,7 @@
           <a:p>
             <a:fld id="{788667A8-8BE1-4384-8E52-CA6CA56C077B}" type="datetimeFigureOut">
               <a:rPr lang="en-US" smtClean="0"/>
-              <a:t>1/17/2021</a:t>
+              <a:t>1/18/2021</a:t>
             </a:fld>
             <a:endParaRPr lang="en-US"/>
           </a:p>
@@ -2791,7 +2791,7 @@
           <a:p>
             <a:fld id="{788667A8-8BE1-4384-8E52-CA6CA56C077B}" type="datetimeFigureOut">
               <a:rPr lang="en-US" smtClean="0"/>
-              <a:t>1/17/2021</a:t>
+              <a:t>1/18/2021</a:t>
             </a:fld>
             <a:endParaRPr lang="en-US"/>
           </a:p>
@@ -3004,7 +3004,7 @@
           <a:p>
             <a:fld id="{788667A8-8BE1-4384-8E52-CA6CA56C077B}" type="datetimeFigureOut">
               <a:rPr lang="en-US" smtClean="0"/>
-              <a:t>1/17/2021</a:t>
+              <a:t>1/18/2021</a:t>
             </a:fld>
             <a:endParaRPr lang="en-US"/>
           </a:p>
@@ -5744,7 +5744,7 @@
         </p:nvSpPr>
         <p:spPr>
           <a:xfrm>
-            <a:off x="7046860" y="1946344"/>
+            <a:off x="4910604" y="1910833"/>
             <a:ext cx="1229757" cy="616128"/>
           </a:xfrm>
           <a:prstGeom prst="wedgeRoundRectCallout">
@@ -5816,7 +5816,7 @@
         </p:nvSpPr>
         <p:spPr>
           <a:xfrm>
-            <a:off x="6999843" y="951056"/>
+            <a:off x="4034701" y="968811"/>
             <a:ext cx="1229757" cy="616128"/>
           </a:xfrm>
           <a:prstGeom prst="wedgeRoundRectCallout">

</xml_diff>